<commit_message>
Fixes typos in lubridate cheatsheet.
</commit_message>
<xml_diff>
--- a/powerpoints/lubridate.pptx
+++ b/powerpoints/lubridate.pptx
@@ -11410,7 +11410,7 @@
       </p:sp>
       <p:sp>
         <p:nvSpPr>
-          <p:cNvPr id="296" name="Identify the order of the year (y), month (m), day (d), hour (h), minute (m) and second (s) elements in your data…"/>
+          <p:cNvPr id="296" name="Identify the order of the year (y), month (m), day (d), hour (h), minute (m) and second (s) elements in your data.…"/>
           <p:cNvSpPr txBox="1"/>
           <p:nvPr/>
         </p:nvSpPr>
@@ -11495,7 +11495,7 @@
               <a:t>s</a:t>
             </a:r>
             <a:r>
-              <a:t>) elements in your data</a:t>
+              <a:t>) elements in your data.</a:t>
             </a:r>
           </a:p>
           <a:p>
@@ -11605,7 +11605,7 @@
       </p:sp>
       <p:sp>
         <p:nvSpPr>
-          <p:cNvPr id="299" name="date_decimal(decimal, tz = &quot;UTC&quot;) Q for quarter. date_decimal(2017.5)…"/>
+          <p:cNvPr id="299" name="date_decimal(decimal, tz = &quot;UTC&quot;) date_decimal(2017.5)…"/>
           <p:cNvSpPr txBox="1"/>
           <p:nvPr/>
         </p:nvSpPr>
@@ -11650,7 +11650,7 @@
               <a:t>date_decimal</a:t>
             </a:r>
             <a:r>
-              <a:t>(decimal, tz = "UTC") Q for quarter. </a:t>
+              <a:t>(decimal, tz = "UTC") </a:t>
             </a:r>
             <a:r>
               <a:rPr i="1"/>
@@ -27535,7 +27535,7 @@
               <a:t>nanoseconds</a:t>
             </a:r>
             <a:r>
-              <a:t>(x = 1) x milliseconds.</a:t>
+              <a:t>(x = 1) x nanoseconds.</a:t>
             </a:r>
             <a:endParaRPr i="1"/>
           </a:p>
@@ -30161,7 +30161,7 @@
             </a:pPr>
             <a:r>
               <a:rPr i="1"/>
-              <a:t>v &lt;-c(dt, dt + 100, dt + 1000)); int_diff(v)</a:t>
+              <a:t>v &lt;-c(dt, dt + 100, dt + 1000); int_diff(v)</a:t>
             </a:r>
             <a:endParaRPr i="1"/>
           </a:p>
@@ -34664,7 +34664,7 @@
                 </a:defRPr>
               </a:pPr>
               <a:r>
-                <a:t>normal + dminutes(90)</a:t>
+                <a:t>nor + dminutes(90)</a:t>
               </a:r>
             </a:p>
             <a:p>
@@ -38656,7 +38656,7 @@
                 </a:defRPr>
               </a:pPr>
               <a:r>
-                <a:t>normal + minutes(90)</a:t>
+                <a:t>nor + minutes(90)</a:t>
               </a:r>
             </a:p>
             <a:p>
@@ -41310,7 +41310,7 @@
                 </a:defRPr>
               </a:pPr>
               <a:r>
-                <a:t>interval(normal, normal + minutes(90))</a:t>
+                <a:t>interval(nor, nor + minutes(90))</a:t>
               </a:r>
             </a:p>
             <a:p>

</xml_diff>